<commit_message>
Adding frontend and back
</commit_message>
<xml_diff>
--- a/Presentation1.pptx
+++ b/Presentation1.pptx
@@ -5,36 +5,41 @@
     <p:sldMasterId id="2147483648" r:id="rId4"/>
   </p:sldMasterIdLst>
   <p:notesMasterIdLst>
-    <p:notesMasterId r:id="rId13"/>
+    <p:notesMasterId r:id="rId14"/>
   </p:notesMasterIdLst>
   <p:sldIdLst>
     <p:sldId id="397" r:id="rId5"/>
-    <p:sldId id="377" r:id="rId6"/>
-    <p:sldId id="330" r:id="rId7"/>
-    <p:sldId id="259" r:id="rId8"/>
-    <p:sldId id="413" r:id="rId9"/>
-    <p:sldId id="414" r:id="rId10"/>
-    <p:sldId id="404" r:id="rId11"/>
-    <p:sldId id="325" r:id="rId12"/>
+    <p:sldId id="415" r:id="rId6"/>
+    <p:sldId id="377" r:id="rId7"/>
+    <p:sldId id="330" r:id="rId8"/>
+    <p:sldId id="259" r:id="rId9"/>
+    <p:sldId id="413" r:id="rId10"/>
+    <p:sldId id="414" r:id="rId11"/>
+    <p:sldId id="404" r:id="rId12"/>
+    <p:sldId id="325" r:id="rId13"/>
   </p:sldIdLst>
   <p:sldSz cx="12192000" cy="6858000"/>
   <p:notesSz cx="6858000" cy="9144000"/>
   <p:embeddedFontLst>
     <p:embeddedFont>
       <p:font typeface="Slalom Sans" pitchFamily="2" charset="77"/>
-      <p:regular r:id="rId14"/>
+      <p:regular r:id="rId15"/>
     </p:embeddedFont>
     <p:embeddedFont>
       <p:font typeface="Slalom Sans Bold" pitchFamily="2" charset="77"/>
-      <p:bold r:id="rId15"/>
+      <p:bold r:id="rId16"/>
     </p:embeddedFont>
     <p:embeddedFont>
       <p:font typeface="Slalom Sans Light" pitchFamily="2" charset="77"/>
-      <p:regular r:id="rId16"/>
+      <p:regular r:id="rId17"/>
+    </p:embeddedFont>
+    <p:embeddedFont>
+      <p:font typeface="Slalom Sans Light Italic" pitchFamily="2" charset="77"/>
+      <p:italic r:id="rId18"/>
     </p:embeddedFont>
     <p:embeddedFont>
       <p:font typeface="SlalomSans-Light" pitchFamily="2" charset="77"/>
-      <p:regular r:id="rId17"/>
+      <p:regular r:id="rId19"/>
     </p:embeddedFont>
   </p:embeddedFontLst>
   <p:defaultTextStyle>
@@ -138,6 +143,7 @@
         <p14:section name="HOW TO USE" id="{32560B7E-5C9A-4B6D-A024-DB7C70BA23CC}">
           <p14:sldIdLst>
             <p14:sldId id="397"/>
+            <p14:sldId id="415"/>
             <p14:sldId id="377"/>
             <p14:sldId id="330"/>
           </p14:sldIdLst>
@@ -299,7 +305,7 @@
             <a:fld id="{8F5E64C8-9D9E-4CF5-AA89-8B029B5028BE}" type="datetimeFigureOut">
               <a:rPr lang="en-GB" smtClean="0"/>
               <a:pPr/>
-              <a:t>10/11/2021</a:t>
+              <a:t>11/11/2021</a:t>
             </a:fld>
             <a:endParaRPr lang="en-GB" dirty="0"/>
           </a:p>
@@ -637,7 +643,7 @@
           <a:p>
             <a:fld id="{C808EFC2-4632-4E01-92E9-1642575513B6}" type="slidenum">
               <a:rPr lang="en-GB" smtClean="0"/>
-              <a:t>2</a:t>
+              <a:t>3</a:t>
             </a:fld>
             <a:endParaRPr lang="en-GB"/>
           </a:p>
@@ -721,7 +727,7 @@
           <a:p>
             <a:fld id="{C808EFC2-4632-4E01-92E9-1642575513B6}" type="slidenum">
               <a:rPr lang="en-GB" smtClean="0"/>
-              <a:t>3</a:t>
+              <a:t>4</a:t>
             </a:fld>
             <a:endParaRPr lang="en-GB"/>
           </a:p>
@@ -774,7 +780,7 @@
           <a:p>
             <a:fld id="{DB7EE005-9238-4EDB-8632-E512DDF58CAA}" type="datetime1">
               <a:rPr lang="en-GB" smtClean="0"/>
-              <a:t>10/11/2021</a:t>
+              <a:t>11/11/2021</a:t>
             </a:fld>
             <a:endParaRPr lang="en-GB"/>
           </a:p>
@@ -921,7 +927,7 @@
           <a:p>
             <a:fld id="{4552F92F-1A4C-4811-A2F0-0FC9FC2DF3E9}" type="datetime1">
               <a:rPr lang="en-GB" smtClean="0"/>
-              <a:t>10/11/2021</a:t>
+              <a:t>11/11/2021</a:t>
             </a:fld>
             <a:endParaRPr lang="en-GB"/>
           </a:p>
@@ -1024,7 +1030,7 @@
           <a:p>
             <a:fld id="{4552F92F-1A4C-4811-A2F0-0FC9FC2DF3E9}" type="datetime1">
               <a:rPr lang="en-GB" smtClean="0"/>
-              <a:t>10/11/2021</a:t>
+              <a:t>11/11/2021</a:t>
             </a:fld>
             <a:endParaRPr lang="en-GB"/>
           </a:p>
@@ -1168,7 +1174,7 @@
           <a:p>
             <a:fld id="{F6EF39B3-04F5-42A6-A55F-73F9A76E46F8}" type="datetime1">
               <a:rPr lang="en-GB" smtClean="0"/>
-              <a:t>10/11/2021</a:t>
+              <a:t>11/11/2021</a:t>
             </a:fld>
             <a:endParaRPr lang="en-GB"/>
           </a:p>
@@ -1321,7 +1327,7 @@
           <a:p>
             <a:fld id="{F6EF39B3-04F5-42A6-A55F-73F9A76E46F8}" type="datetime1">
               <a:rPr lang="en-GB" smtClean="0"/>
-              <a:t>10/11/2021</a:t>
+              <a:t>11/11/2021</a:t>
             </a:fld>
             <a:endParaRPr lang="en-GB"/>
           </a:p>
@@ -2478,7 +2484,7 @@
           <a:p>
             <a:fld id="{DB7EE005-9238-4EDB-8632-E512DDF58CAA}" type="datetime1">
               <a:rPr lang="en-GB" smtClean="0"/>
-              <a:t>10/11/2021</a:t>
+              <a:t>11/11/2021</a:t>
             </a:fld>
             <a:endParaRPr lang="en-GB"/>
           </a:p>
@@ -2795,7 +2801,7 @@
           <a:p>
             <a:fld id="{DB7EE005-9238-4EDB-8632-E512DDF58CAA}" type="datetime1">
               <a:rPr lang="en-GB" smtClean="0"/>
-              <a:t>10/11/2021</a:t>
+              <a:t>11/11/2021</a:t>
             </a:fld>
             <a:endParaRPr lang="en-GB"/>
           </a:p>
@@ -2988,7 +2994,7 @@
           <a:p>
             <a:fld id="{DB7EE005-9238-4EDB-8632-E512DDF58CAA}" type="datetime1">
               <a:rPr lang="en-GB" smtClean="0"/>
-              <a:t>10/11/2021</a:t>
+              <a:t>11/11/2021</a:t>
             </a:fld>
             <a:endParaRPr lang="en-GB"/>
           </a:p>
@@ -3265,7 +3271,7 @@
           <a:p>
             <a:fld id="{F6EF39B3-04F5-42A6-A55F-73F9A76E46F8}" type="datetime1">
               <a:rPr lang="en-GB" smtClean="0"/>
-              <a:t>10/11/2021</a:t>
+              <a:t>11/11/2021</a:t>
             </a:fld>
             <a:endParaRPr lang="en-GB"/>
           </a:p>
@@ -3399,7 +3405,7 @@
           <a:p>
             <a:fld id="{F6EF39B3-04F5-42A6-A55F-73F9A76E46F8}" type="datetime1">
               <a:rPr lang="en-GB" smtClean="0"/>
-              <a:t>10/11/2021</a:t>
+              <a:t>11/11/2021</a:t>
             </a:fld>
             <a:endParaRPr lang="en-GB"/>
           </a:p>
@@ -3743,7 +3749,7 @@
           <a:p>
             <a:fld id="{F6EF39B3-04F5-42A6-A55F-73F9A76E46F8}" type="datetime1">
               <a:rPr lang="en-GB" smtClean="0"/>
-              <a:t>10/11/2021</a:t>
+              <a:t>11/11/2021</a:t>
             </a:fld>
             <a:endParaRPr lang="en-GB"/>
           </a:p>
@@ -3894,7 +3900,7 @@
             <a:fld id="{F6DCCAE5-81E0-4F95-BC28-74328FF60048}" type="datetime1">
               <a:rPr lang="en-GB" smtClean="0"/>
               <a:pPr/>
-              <a:t>10/11/2021</a:t>
+              <a:t>11/11/2021</a:t>
             </a:fld>
             <a:endParaRPr lang="en-GB"/>
           </a:p>
@@ -4056,7 +4062,7 @@
           <a:p>
             <a:fld id="{F6EF39B3-04F5-42A6-A55F-73F9A76E46F8}" type="datetime1">
               <a:rPr lang="en-GB" smtClean="0"/>
-              <a:t>10/11/2021</a:t>
+              <a:t>11/11/2021</a:t>
             </a:fld>
             <a:endParaRPr lang="en-GB"/>
           </a:p>
@@ -4237,7 +4243,7 @@
           <a:p>
             <a:fld id="{1D8BD707-D9CF-40AE-B4C6-C98DA3205C09}" type="datetimeFigureOut">
               <a:rPr lang="en-US"/>
-              <a:t>11/10/21</a:t>
+              <a:t>11/11/21</a:t>
             </a:fld>
             <a:endParaRPr lang="en-US"/>
           </a:p>
@@ -4459,7 +4465,7 @@
           <a:p>
             <a:fld id="{1D8BD707-D9CF-40AE-B4C6-C98DA3205C09}" type="datetimeFigureOut">
               <a:rPr lang="en-US"/>
-              <a:t>11/10/21</a:t>
+              <a:t>11/11/21</a:t>
             </a:fld>
             <a:endParaRPr lang="en-US"/>
           </a:p>
@@ -4544,7 +4550,7 @@
           <a:p>
             <a:fld id="{DB7EE005-9238-4EDB-8632-E512DDF58CAA}" type="datetime1">
               <a:rPr lang="en-GB" smtClean="0"/>
-              <a:t>10/11/2021</a:t>
+              <a:t>11/11/2021</a:t>
             </a:fld>
             <a:endParaRPr lang="en-GB"/>
           </a:p>
@@ -4696,7 +4702,7 @@
             <a:fld id="{F6DCCAE5-81E0-4F95-BC28-74328FF60048}" type="datetime1">
               <a:rPr lang="en-GB" smtClean="0"/>
               <a:pPr/>
-              <a:t>10/11/2021</a:t>
+              <a:t>11/11/2021</a:t>
             </a:fld>
             <a:endParaRPr lang="en-GB"/>
           </a:p>
@@ -4886,7 +4892,7 @@
           <a:p>
             <a:fld id="{DB7EE005-9238-4EDB-8632-E512DDF58CAA}" type="datetime1">
               <a:rPr lang="en-GB" smtClean="0"/>
-              <a:t>10/11/2021</a:t>
+              <a:t>11/11/2021</a:t>
             </a:fld>
             <a:endParaRPr lang="en-GB"/>
           </a:p>
@@ -5006,7 +5012,7 @@
             <a:fld id="{F6DCCAE5-81E0-4F95-BC28-74328FF60048}" type="datetime1">
               <a:rPr lang="en-GB" smtClean="0"/>
               <a:pPr/>
-              <a:t>10/11/2021</a:t>
+              <a:t>11/11/2021</a:t>
             </a:fld>
             <a:endParaRPr lang="en-GB"/>
           </a:p>
@@ -5221,7 +5227,7 @@
           <a:p>
             <a:fld id="{F6EF39B3-04F5-42A6-A55F-73F9A76E46F8}" type="datetime1">
               <a:rPr lang="en-GB" smtClean="0"/>
-              <a:t>10/11/2021</a:t>
+              <a:t>11/11/2021</a:t>
             </a:fld>
             <a:endParaRPr lang="en-GB"/>
           </a:p>
@@ -5413,7 +5419,7 @@
           <a:p>
             <a:fld id="{4552F92F-1A4C-4811-A2F0-0FC9FC2DF3E9}" type="datetime1">
               <a:rPr lang="en-GB" smtClean="0"/>
-              <a:t>10/11/2021</a:t>
+              <a:t>11/11/2021</a:t>
             </a:fld>
             <a:endParaRPr lang="en-GB"/>
           </a:p>
@@ -5552,7 +5558,7 @@
           <a:p>
             <a:fld id="{4552F92F-1A4C-4811-A2F0-0FC9FC2DF3E9}" type="datetime1">
               <a:rPr lang="en-GB" smtClean="0"/>
-              <a:t>10/11/2021</a:t>
+              <a:t>11/11/2021</a:t>
             </a:fld>
             <a:endParaRPr lang="en-GB"/>
           </a:p>
@@ -5803,7 +5809,7 @@
           <a:p>
             <a:fld id="{F6EF39B3-04F5-42A6-A55F-73F9A76E46F8}" type="datetime1">
               <a:rPr lang="en-GB" smtClean="0"/>
-              <a:t>10/11/2021</a:t>
+              <a:t>11/11/2021</a:t>
             </a:fld>
             <a:endParaRPr lang="en-GB"/>
           </a:p>
@@ -6556,7 +6562,7 @@
         <p:spPr>
           <a:xfrm>
             <a:off x="601741" y="836634"/>
-            <a:ext cx="7130318" cy="3022672"/>
+            <a:ext cx="9082086" cy="3022672"/>
           </a:xfrm>
           <a:prstGeom prst="rect">
             <a:avLst/>
@@ -6597,7 +6603,7 @@
                   <a:schemeClr val="bg1"/>
                 </a:solidFill>
               </a:rPr>
-              <a:t>CI/CD – A better process </a:t>
+              <a:t>CI/CD – A better way </a:t>
             </a:r>
           </a:p>
         </p:txBody>
@@ -6670,10 +6676,39 @@
       </p:grpSpPr>
       <p:sp>
         <p:nvSpPr>
+          <p:cNvPr id="2" name="Footer Placeholder 1">
+            <a:extLst>
+              <a:ext uri="{FF2B5EF4-FFF2-40B4-BE49-F238E27FC236}">
+                <a16:creationId xmlns:a16="http://schemas.microsoft.com/office/drawing/2014/main" id="{DA4AE22D-3E81-6148-8A0D-4773C3E1A8BF}"/>
+              </a:ext>
+            </a:extLst>
+          </p:cNvPr>
+          <p:cNvSpPr>
+            <a:spLocks noGrp="1"/>
+          </p:cNvSpPr>
+          <p:nvPr>
+            <p:ph type="ftr" sz="quarter" idx="11"/>
+          </p:nvPr>
+        </p:nvSpPr>
+        <p:spPr/>
+        <p:txBody>
+          <a:bodyPr/>
+          <a:lstStyle/>
+          <a:p>
+            <a:r>
+              <a:rPr lang="en-US"/>
+              <a:t>© SLALOM. ALL RIGHTS RESERVED. PROPRIETARY AND CONFIDENTIAL.</a:t>
+            </a:r>
+            <a:endParaRPr lang="en-US" dirty="0"/>
+          </a:p>
+        </p:txBody>
+      </p:sp>
+      <p:sp>
+        <p:nvSpPr>
           <p:cNvPr id="3" name="Slide Number Placeholder 2">
             <a:extLst>
               <a:ext uri="{FF2B5EF4-FFF2-40B4-BE49-F238E27FC236}">
-                <a16:creationId xmlns:a16="http://schemas.microsoft.com/office/drawing/2014/main" id="{A0EB6E26-8E08-1E42-95A8-8C3B6D0179DD}"/>
+                <a16:creationId xmlns:a16="http://schemas.microsoft.com/office/drawing/2014/main" id="{489279E0-65A3-4A41-90D4-B78221DCEBA9}"/>
               </a:ext>
             </a:extLst>
           </p:cNvPr>
@@ -6699,10 +6734,70 @@
       </p:sp>
       <p:sp>
         <p:nvSpPr>
-          <p:cNvPr id="12" name="object 2">
-            <a:extLst>
-              <a:ext uri="{FF2B5EF4-FFF2-40B4-BE49-F238E27FC236}">
-                <a16:creationId xmlns:a16="http://schemas.microsoft.com/office/drawing/2014/main" id="{710E9DC8-2183-C44F-AEC0-4C5CC85BA8ED}"/>
+          <p:cNvPr id="4" name="TextBox 3">
+            <a:extLst>
+              <a:ext uri="{FF2B5EF4-FFF2-40B4-BE49-F238E27FC236}">
+                <a16:creationId xmlns:a16="http://schemas.microsoft.com/office/drawing/2014/main" id="{E1BC9009-A8D0-AE42-B5F2-56531E042414}"/>
+              </a:ext>
+            </a:extLst>
+          </p:cNvPr>
+          <p:cNvSpPr txBox="1"/>
+          <p:nvPr/>
+        </p:nvSpPr>
+        <p:spPr>
+          <a:xfrm>
+            <a:off x="368527" y="1753277"/>
+            <a:ext cx="11022914" cy="3522134"/>
+          </a:xfrm>
+          <a:prstGeom prst="rect">
+            <a:avLst/>
+          </a:prstGeom>
+          <a:noFill/>
+        </p:spPr>
+        <p:txBody>
+          <a:bodyPr wrap="square" lIns="0" rtlCol="0">
+            <a:noAutofit/>
+          </a:bodyPr>
+          <a:lstStyle/>
+          <a:p>
+            <a:r>
+              <a:rPr lang="en-US" sz="2400" dirty="0">
+                <a:latin typeface="Slalom Sans Light" panose="00000400000000000000" pitchFamily="50" charset="0"/>
+              </a:rPr>
+              <a:t>As UdaPeople’s  revolutionary human resource product continues it’s journey to the cloud for innovation and agility, the client is looking for support to rationalize their portfolio of applications in order to help determine the feasibility, total cost of ownership and cost of migrating to AWS. </a:t>
+            </a:r>
+          </a:p>
+          <a:p>
+            <a:endParaRPr lang="en-US" sz="2400" dirty="0">
+              <a:latin typeface="Slalom Sans Light" panose="00000400000000000000" pitchFamily="50" charset="0"/>
+            </a:endParaRPr>
+          </a:p>
+          <a:p>
+            <a:r>
+              <a:rPr lang="en-US" sz="2400" dirty="0">
+                <a:latin typeface="Slalom Sans Light" panose="00000400000000000000" pitchFamily="50" charset="0"/>
+              </a:rPr>
+              <a:t>Since the client wants to leverage industry best practices to design and implement the foundation and operating model, CI/CD is the best way to accelerate this transformation and service delivery. The process of Continuous Integration and Continuous Delivery is best suited for this production since it fulfills the customer demands with minimal overhead in terms of number of errors or time to market. </a:t>
+            </a:r>
+          </a:p>
+          <a:p>
+            <a:endParaRPr lang="en-US" sz="2400" dirty="0">
+              <a:latin typeface="Slalom Sans Light" panose="00000400000000000000" pitchFamily="50" charset="0"/>
+            </a:endParaRPr>
+          </a:p>
+          <a:p>
+            <a:endParaRPr lang="en-US" sz="2400" dirty="0">
+              <a:latin typeface="Slalom Sans Light" panose="00000400000000000000" pitchFamily="50" charset="0"/>
+            </a:endParaRPr>
+          </a:p>
+        </p:txBody>
+      </p:sp>
+      <p:sp>
+        <p:nvSpPr>
+          <p:cNvPr id="6" name="object 2">
+            <a:extLst>
+              <a:ext uri="{FF2B5EF4-FFF2-40B4-BE49-F238E27FC236}">
+                <a16:creationId xmlns:a16="http://schemas.microsoft.com/office/drawing/2014/main" id="{0A9AD9E1-0F28-BC44-BCD9-7D08BCE7F90C}"/>
               </a:ext>
             </a:extLst>
           </p:cNvPr>
@@ -6713,7 +6808,7 @@
         </p:nvSpPr>
         <p:spPr>
           <a:xfrm>
-            <a:off x="383081" y="826837"/>
+            <a:off x="269374" y="620881"/>
             <a:ext cx="8706851" cy="853772"/>
           </a:xfrm>
           <a:prstGeom prst="rect">
@@ -6755,10 +6850,18 @@
             <a:r>
               <a:rPr lang="en-GB" sz="5500" spc="-158" dirty="0">
                 <a:solidFill>
+                  <a:schemeClr val="accent1"/>
+                </a:solidFill>
+              </a:rPr>
+              <a:t>Our</a:t>
+            </a:r>
+            <a:r>
+              <a:rPr lang="en-GB" sz="5500" spc="-158" dirty="0">
+                <a:solidFill>
                   <a:schemeClr val="tx1"/>
                 </a:solidFill>
               </a:rPr>
-              <a:t>Continuous Integration </a:t>
+              <a:t> Understanding</a:t>
             </a:r>
             <a:endParaRPr lang="en-GB" sz="5500" spc="-164" dirty="0">
               <a:solidFill>
@@ -6768,93 +6871,10 @@
           </a:p>
         </p:txBody>
       </p:sp>
-      <p:sp>
-        <p:nvSpPr>
-          <p:cNvPr id="13" name="Footer Placeholder 1">
-            <a:extLst>
-              <a:ext uri="{FF2B5EF4-FFF2-40B4-BE49-F238E27FC236}">
-                <a16:creationId xmlns:a16="http://schemas.microsoft.com/office/drawing/2014/main" id="{17C04ED9-A3C0-A34B-82CC-FB91E416FE70}"/>
-              </a:ext>
-            </a:extLst>
-          </p:cNvPr>
-          <p:cNvSpPr>
-            <a:spLocks noGrp="1"/>
-          </p:cNvSpPr>
-          <p:nvPr>
-            <p:ph type="ftr" sz="quarter" idx="11"/>
-          </p:nvPr>
-        </p:nvSpPr>
-        <p:spPr>
-          <a:xfrm>
-            <a:off x="609600" y="6330689"/>
-            <a:ext cx="4013200" cy="365125"/>
-          </a:xfrm>
-        </p:spPr>
-        <p:txBody>
-          <a:bodyPr/>
-          <a:lstStyle/>
-          <a:p>
-            <a:r>
-              <a:rPr lang="en-US" dirty="0"/>
-              <a:t>© 2021 Slalom, LLC CONFIDENTIAL &amp; PROPRIETARY</a:t>
-            </a:r>
-          </a:p>
-        </p:txBody>
-      </p:sp>
-      <p:sp>
-        <p:nvSpPr>
-          <p:cNvPr id="5" name="TextBox 4">
-            <a:extLst>
-              <a:ext uri="{FF2B5EF4-FFF2-40B4-BE49-F238E27FC236}">
-                <a16:creationId xmlns:a16="http://schemas.microsoft.com/office/drawing/2014/main" id="{8B0ACA20-BC2D-0445-90AB-100678083CE0}"/>
-              </a:ext>
-            </a:extLst>
-          </p:cNvPr>
-          <p:cNvSpPr txBox="1"/>
-          <p:nvPr/>
-        </p:nvSpPr>
-        <p:spPr>
-          <a:xfrm>
-            <a:off x="770965" y="2617694"/>
-            <a:ext cx="10327341" cy="2868706"/>
-          </a:xfrm>
-          <a:prstGeom prst="rect">
-            <a:avLst/>
-          </a:prstGeom>
-          <a:noFill/>
-        </p:spPr>
-        <p:txBody>
-          <a:bodyPr wrap="square" lIns="0" rtlCol="0">
-            <a:noAutofit/>
-          </a:bodyPr>
-          <a:lstStyle/>
-          <a:p>
-            <a:r>
-              <a:rPr lang="en-US" sz="2400" dirty="0">
-                <a:latin typeface="Slalom Sans Light" panose="00000400000000000000" pitchFamily="50" charset="0"/>
-              </a:rPr>
-              <a:t>The practice of merging all developers’ working copies to a shared mainline several times to avoid conflicts in the code. It’s an important step to ensure that the code we have is a high quality, deployable artifact.</a:t>
-            </a:r>
-          </a:p>
-          <a:p>
-            <a:endParaRPr lang="en-US" sz="2400" dirty="0">
-              <a:latin typeface="Slalom Sans Light" panose="00000400000000000000" pitchFamily="50" charset="0"/>
-            </a:endParaRPr>
-          </a:p>
-          <a:p>
-            <a:r>
-              <a:rPr lang="en-US" sz="2400" dirty="0">
-                <a:latin typeface="Slalom Sans Light" panose="00000400000000000000" pitchFamily="50" charset="0"/>
-              </a:rPr>
-              <a:t>Some of the steps in this stage include: compiling, testing, running static analysis, checking for vulnerabilities in dependencies and storing code artifacts</a:t>
-            </a:r>
-          </a:p>
-        </p:txBody>
-      </p:sp>
     </p:spTree>
     <p:extLst>
       <p:ext uri="{BB962C8B-B14F-4D97-AF65-F5344CB8AC3E}">
-        <p14:creationId xmlns:p14="http://schemas.microsoft.com/office/powerpoint/2010/main" val="2981195276"/>
+        <p14:creationId xmlns:p14="http://schemas.microsoft.com/office/powerpoint/2010/main" val="3832331903"/>
       </p:ext>
     </p:extLst>
   </p:cSld>
@@ -6883,10 +6903,39 @@
       </p:grpSpPr>
       <p:sp>
         <p:nvSpPr>
-          <p:cNvPr id="4" name="object 2">
-            <a:extLst>
-              <a:ext uri="{FF2B5EF4-FFF2-40B4-BE49-F238E27FC236}">
-                <a16:creationId xmlns:a16="http://schemas.microsoft.com/office/drawing/2014/main" id="{3D48F523-EBF1-1B4C-85F4-3A4B2167976D}"/>
+          <p:cNvPr id="3" name="Slide Number Placeholder 2">
+            <a:extLst>
+              <a:ext uri="{FF2B5EF4-FFF2-40B4-BE49-F238E27FC236}">
+                <a16:creationId xmlns:a16="http://schemas.microsoft.com/office/drawing/2014/main" id="{A0EB6E26-8E08-1E42-95A8-8C3B6D0179DD}"/>
+              </a:ext>
+            </a:extLst>
+          </p:cNvPr>
+          <p:cNvSpPr>
+            <a:spLocks noGrp="1"/>
+          </p:cNvSpPr>
+          <p:nvPr>
+            <p:ph type="sldNum" sz="quarter" idx="12"/>
+          </p:nvPr>
+        </p:nvSpPr>
+        <p:spPr/>
+        <p:txBody>
+          <a:bodyPr/>
+          <a:lstStyle/>
+          <a:p>
+            <a:fld id="{D89D76C3-A5A9-4168-BE2E-6A3D1757D92E}" type="slidenum">
+              <a:rPr lang="en-GB" smtClean="0"/>
+              <a:t>3</a:t>
+            </a:fld>
+            <a:endParaRPr lang="en-GB"/>
+          </a:p>
+        </p:txBody>
+      </p:sp>
+      <p:sp>
+        <p:nvSpPr>
+          <p:cNvPr id="12" name="object 2">
+            <a:extLst>
+              <a:ext uri="{FF2B5EF4-FFF2-40B4-BE49-F238E27FC236}">
+                <a16:creationId xmlns:a16="http://schemas.microsoft.com/office/drawing/2014/main" id="{710E9DC8-2183-C44F-AEC0-4C5CC85BA8ED}"/>
               </a:ext>
             </a:extLst>
           </p:cNvPr>
@@ -6897,7 +6946,7 @@
         </p:nvSpPr>
         <p:spPr>
           <a:xfrm>
-            <a:off x="601741" y="1204524"/>
+            <a:off x="383081" y="826837"/>
             <a:ext cx="8706851" cy="853772"/>
           </a:xfrm>
           <a:prstGeom prst="rect">
@@ -6939,6 +6988,214 @@
             <a:r>
               <a:rPr lang="en-GB" sz="5500" spc="-158" dirty="0">
                 <a:solidFill>
+                  <a:schemeClr val="tx1"/>
+                </a:solidFill>
+              </a:rPr>
+              <a:t>Continuous Integration </a:t>
+            </a:r>
+            <a:endParaRPr lang="en-GB" sz="5500" spc="-164" dirty="0">
+              <a:solidFill>
+                <a:schemeClr val="tx1"/>
+              </a:solidFill>
+            </a:endParaRPr>
+          </a:p>
+        </p:txBody>
+      </p:sp>
+      <p:sp>
+        <p:nvSpPr>
+          <p:cNvPr id="13" name="Footer Placeholder 1">
+            <a:extLst>
+              <a:ext uri="{FF2B5EF4-FFF2-40B4-BE49-F238E27FC236}">
+                <a16:creationId xmlns:a16="http://schemas.microsoft.com/office/drawing/2014/main" id="{17C04ED9-A3C0-A34B-82CC-FB91E416FE70}"/>
+              </a:ext>
+            </a:extLst>
+          </p:cNvPr>
+          <p:cNvSpPr>
+            <a:spLocks noGrp="1"/>
+          </p:cNvSpPr>
+          <p:nvPr>
+            <p:ph type="ftr" sz="quarter" idx="11"/>
+          </p:nvPr>
+        </p:nvSpPr>
+        <p:spPr>
+          <a:xfrm>
+            <a:off x="609600" y="6330689"/>
+            <a:ext cx="4013200" cy="365125"/>
+          </a:xfrm>
+        </p:spPr>
+        <p:txBody>
+          <a:bodyPr/>
+          <a:lstStyle/>
+          <a:p>
+            <a:r>
+              <a:rPr lang="en-US" dirty="0"/>
+              <a:t>© 2021 Slalom, LLC CONFIDENTIAL &amp; PROPRIETARY</a:t>
+            </a:r>
+          </a:p>
+        </p:txBody>
+      </p:sp>
+      <p:sp>
+        <p:nvSpPr>
+          <p:cNvPr id="5" name="TextBox 4">
+            <a:extLst>
+              <a:ext uri="{FF2B5EF4-FFF2-40B4-BE49-F238E27FC236}">
+                <a16:creationId xmlns:a16="http://schemas.microsoft.com/office/drawing/2014/main" id="{8B0ACA20-BC2D-0445-90AB-100678083CE0}"/>
+              </a:ext>
+            </a:extLst>
+          </p:cNvPr>
+          <p:cNvSpPr txBox="1"/>
+          <p:nvPr/>
+        </p:nvSpPr>
+        <p:spPr>
+          <a:xfrm>
+            <a:off x="932329" y="2200005"/>
+            <a:ext cx="10327341" cy="2868706"/>
+          </a:xfrm>
+          <a:prstGeom prst="rect">
+            <a:avLst/>
+          </a:prstGeom>
+          <a:noFill/>
+        </p:spPr>
+        <p:txBody>
+          <a:bodyPr wrap="square" lIns="0" rtlCol="0">
+            <a:noAutofit/>
+          </a:bodyPr>
+          <a:lstStyle/>
+          <a:p>
+            <a:r>
+              <a:rPr lang="en-US" sz="2400" dirty="0">
+                <a:latin typeface="Slalom Sans Light" panose="00000400000000000000" pitchFamily="50" charset="0"/>
+              </a:rPr>
+              <a:t>The practice of merging all developers’ working copies to a shared mainline several times to </a:t>
+            </a:r>
+            <a:r>
+              <a:rPr lang="en-US" sz="2400" b="1" dirty="0">
+                <a:latin typeface="Slalom Sans Light Italic" panose="00000400000000000000" pitchFamily="50" charset="0"/>
+              </a:rPr>
+              <a:t>avoid conflicts </a:t>
+            </a:r>
+            <a:r>
+              <a:rPr lang="en-US" sz="2400" dirty="0">
+                <a:latin typeface="Slalom Sans Light" panose="00000400000000000000" pitchFamily="50" charset="0"/>
+              </a:rPr>
+              <a:t>in the code. It’s an important step to ensure that the code we have is a </a:t>
+            </a:r>
+            <a:r>
+              <a:rPr lang="en-US" sz="2400" b="1" dirty="0">
+                <a:latin typeface="Slalom Sans Light Italic" panose="00000400000000000000" pitchFamily="50" charset="0"/>
+              </a:rPr>
+              <a:t>high quality, deployable artifact</a:t>
+            </a:r>
+            <a:r>
+              <a:rPr lang="en-US" sz="2400" dirty="0">
+                <a:latin typeface="Slalom Sans Light" panose="00000400000000000000" pitchFamily="50" charset="0"/>
+              </a:rPr>
+              <a:t>.</a:t>
+            </a:r>
+          </a:p>
+          <a:p>
+            <a:endParaRPr lang="en-US" sz="2400" dirty="0">
+              <a:latin typeface="Slalom Sans Light" panose="00000400000000000000" pitchFamily="50" charset="0"/>
+            </a:endParaRPr>
+          </a:p>
+          <a:p>
+            <a:r>
+              <a:rPr lang="en-US" sz="2400" dirty="0">
+                <a:latin typeface="Slalom Sans Light" panose="00000400000000000000" pitchFamily="50" charset="0"/>
+              </a:rPr>
+              <a:t>Some of the steps in this stage include: compiling, testing, running static analysis, checking for vulnerabilities in dependencies and storing code artifacts</a:t>
+            </a:r>
+          </a:p>
+        </p:txBody>
+      </p:sp>
+    </p:spTree>
+    <p:extLst>
+      <p:ext uri="{BB962C8B-B14F-4D97-AF65-F5344CB8AC3E}">
+        <p14:creationId xmlns:p14="http://schemas.microsoft.com/office/powerpoint/2010/main" val="2981195276"/>
+      </p:ext>
+    </p:extLst>
+  </p:cSld>
+  <p:clrMapOvr>
+    <a:masterClrMapping/>
+  </p:clrMapOvr>
+</p:sld>
+</file>
+
+<file path=ppt/slides/slide4.xml><?xml version="1.0" encoding="utf-8"?>
+<p:sld xmlns:a="http://schemas.openxmlformats.org/drawingml/2006/main" xmlns:r="http://schemas.openxmlformats.org/officeDocument/2006/relationships" xmlns:p="http://schemas.openxmlformats.org/presentationml/2006/main">
+  <p:cSld>
+    <p:spTree>
+      <p:nvGrpSpPr>
+        <p:cNvPr id="1" name=""/>
+        <p:cNvGrpSpPr/>
+        <p:nvPr/>
+      </p:nvGrpSpPr>
+      <p:grpSpPr>
+        <a:xfrm>
+          <a:off x="0" y="0"/>
+          <a:ext cx="0" cy="0"/>
+          <a:chOff x="0" y="0"/>
+          <a:chExt cx="0" cy="0"/>
+        </a:xfrm>
+      </p:grpSpPr>
+      <p:sp>
+        <p:nvSpPr>
+          <p:cNvPr id="4" name="object 2">
+            <a:extLst>
+              <a:ext uri="{FF2B5EF4-FFF2-40B4-BE49-F238E27FC236}">
+                <a16:creationId xmlns:a16="http://schemas.microsoft.com/office/drawing/2014/main" id="{3D48F523-EBF1-1B4C-85F4-3A4B2167976D}"/>
+              </a:ext>
+            </a:extLst>
+          </p:cNvPr>
+          <p:cNvSpPr txBox="1">
+            <a:spLocks/>
+          </p:cNvSpPr>
+          <p:nvPr/>
+        </p:nvSpPr>
+        <p:spPr>
+          <a:xfrm>
+            <a:off x="601741" y="1204524"/>
+            <a:ext cx="8706851" cy="853772"/>
+          </a:xfrm>
+          <a:prstGeom prst="rect">
+            <a:avLst/>
+          </a:prstGeom>
+        </p:spPr>
+        <p:txBody>
+          <a:bodyPr vert="horz" wrap="square" lIns="0" tIns="7315" rIns="0" bIns="0" rtlCol="0">
+            <a:spAutoFit/>
+          </a:bodyPr>
+          <a:lstStyle>
+            <a:lvl1pPr algn="l" defTabSz="914400" rtl="0" eaLnBrk="1" latinLnBrk="0" hangingPunct="1">
+              <a:lnSpc>
+                <a:spcPct val="90000"/>
+              </a:lnSpc>
+              <a:spcBef>
+                <a:spcPct val="0"/>
+              </a:spcBef>
+              <a:buNone/>
+              <a:defRPr sz="4400" kern="1000" spc="-10" baseline="0">
+                <a:solidFill>
+                  <a:schemeClr val="accent2"/>
+                </a:solidFill>
+                <a:latin typeface="Slalom Sans Bold" panose="00000800000000000000" pitchFamily="50" charset="0"/>
+                <a:ea typeface="+mj-ea"/>
+                <a:cs typeface="+mj-cs"/>
+              </a:defRPr>
+            </a:lvl1pPr>
+          </a:lstStyle>
+          <a:p>
+            <a:pPr marL="7700" marR="16170">
+              <a:lnSpc>
+                <a:spcPct val="100200"/>
+              </a:lnSpc>
+              <a:spcBef>
+                <a:spcPts val="58"/>
+              </a:spcBef>
+            </a:pPr>
+            <a:r>
+              <a:rPr lang="en-GB" sz="5500" spc="-158" dirty="0">
+                <a:solidFill>
                   <a:schemeClr val="bg1"/>
                 </a:solidFill>
               </a:rPr>
@@ -7011,8 +7268,8 @@
         </p:nvSpPr>
         <p:spPr>
           <a:xfrm>
-            <a:off x="643964" y="2959971"/>
-            <a:ext cx="10614991" cy="2693505"/>
+            <a:off x="601741" y="2959971"/>
+            <a:ext cx="11016146" cy="2693505"/>
           </a:xfrm>
           <a:prstGeom prst="rect">
             <a:avLst/>
@@ -7032,7 +7289,61 @@
                 </a:solidFill>
                 <a:latin typeface="Slalom Sans Light" panose="00000400000000000000" pitchFamily="50" charset="0"/>
               </a:rPr>
-              <a:t>This is the process by which verified changes are deployed into production when they’re ready and without human input.</a:t>
+              <a:t>This is the process by which </a:t>
+            </a:r>
+            <a:r>
+              <a:rPr lang="en-US" sz="2400" b="1" dirty="0">
+                <a:solidFill>
+                  <a:schemeClr val="bg1"/>
+                </a:solidFill>
+                <a:latin typeface="Slalom Sans Light Italic" panose="00000400000000000000" pitchFamily="50" charset="0"/>
+              </a:rPr>
+              <a:t>verified changes </a:t>
+            </a:r>
+            <a:r>
+              <a:rPr lang="en-US" sz="2400" dirty="0">
+                <a:solidFill>
+                  <a:schemeClr val="bg1"/>
+                </a:solidFill>
+                <a:latin typeface="Slalom Sans Light" panose="00000400000000000000" pitchFamily="50" charset="0"/>
+              </a:rPr>
+              <a:t>are </a:t>
+            </a:r>
+            <a:r>
+              <a:rPr lang="en-US" sz="2400" b="1" dirty="0">
+                <a:solidFill>
+                  <a:schemeClr val="bg1"/>
+                </a:solidFill>
+                <a:latin typeface="Slalom Sans Light Italic" panose="00000400000000000000" pitchFamily="50" charset="0"/>
+              </a:rPr>
+              <a:t>deployed</a:t>
+            </a:r>
+            <a:r>
+              <a:rPr lang="en-US" sz="2400" dirty="0">
+                <a:solidFill>
+                  <a:schemeClr val="bg1"/>
+                </a:solidFill>
+                <a:latin typeface="Slalom Sans Light" panose="00000400000000000000" pitchFamily="50" charset="0"/>
+              </a:rPr>
+              <a:t> </a:t>
+            </a:r>
+            <a:r>
+              <a:rPr lang="en-US" sz="2400" b="1" dirty="0">
+                <a:solidFill>
+                  <a:schemeClr val="bg1"/>
+                </a:solidFill>
+                <a:latin typeface="Slalom Sans Light Italic" panose="00000400000000000000" pitchFamily="50" charset="0"/>
+              </a:rPr>
+              <a:t>into production</a:t>
+            </a:r>
+            <a:r>
+              <a:rPr lang="en-US" sz="2400" dirty="0">
+                <a:solidFill>
+                  <a:schemeClr val="bg1"/>
+                </a:solidFill>
+                <a:latin typeface="Slalom Sans Light" panose="00000400000000000000" pitchFamily="50" charset="0"/>
+              </a:rPr>
+              <a:t> when they’re ready and without human input.</a:t>
             </a:r>
           </a:p>
           <a:p>
@@ -7087,7 +7398,7 @@
 </p:sld>
 </file>
 
-<file path=ppt/slides/slide4.xml><?xml version="1.0" encoding="utf-8"?>
+<file path=ppt/slides/slide5.xml><?xml version="1.0" encoding="utf-8"?>
 <p:sld xmlns:a="http://schemas.openxmlformats.org/drawingml/2006/main" xmlns:r="http://schemas.openxmlformats.org/officeDocument/2006/relationships" xmlns:p="http://schemas.openxmlformats.org/presentationml/2006/main">
   <p:cSld>
     <p:spTree>
@@ -7122,102 +7433,9 @@
             <a:fld id="{D89D76C3-A5A9-4168-BE2E-6A3D1757D92E}" type="slidenum">
               <a:rPr lang="en-GB" smtClean="0"/>
               <a:pPr/>
-              <a:t>4</a:t>
+              <a:t>5</a:t>
             </a:fld>
             <a:endParaRPr lang="en-GB"/>
-          </a:p>
-        </p:txBody>
-      </p:sp>
-      <p:sp>
-        <p:nvSpPr>
-          <p:cNvPr id="12" name="Rectangle 11"/>
-          <p:cNvSpPr/>
-          <p:nvPr/>
-        </p:nvSpPr>
-        <p:spPr>
-          <a:xfrm>
-            <a:off x="12557760" y="0"/>
-            <a:ext cx="2819400" cy="762000"/>
-          </a:xfrm>
-          <a:prstGeom prst="rect">
-            <a:avLst/>
-          </a:prstGeom>
-          <a:solidFill>
-            <a:schemeClr val="accent5"/>
-          </a:solidFill>
-          <a:ln>
-            <a:noFill/>
-          </a:ln>
-        </p:spPr>
-        <p:style>
-          <a:lnRef idx="2">
-            <a:schemeClr val="accent1">
-              <a:shade val="50000"/>
-            </a:schemeClr>
-          </a:lnRef>
-          <a:fillRef idx="1">
-            <a:schemeClr val="accent1"/>
-          </a:fillRef>
-          <a:effectRef idx="0">
-            <a:schemeClr val="accent1"/>
-          </a:effectRef>
-          <a:fontRef idx="minor">
-            <a:schemeClr val="lt1"/>
-          </a:fontRef>
-        </p:style>
-        <p:txBody>
-          <a:bodyPr lIns="182880" tIns="182880" rIns="91440" rtlCol="0" anchor="t"/>
-          <a:lstStyle/>
-          <a:p>
-            <a:r>
-              <a:rPr lang="en-US">
-                <a:solidFill>
-                  <a:schemeClr val="accent2"/>
-                </a:solidFill>
-                <a:latin typeface="Slalom Sans Light" panose="00000400000000000000" pitchFamily="50" charset="0"/>
-              </a:rPr>
-              <a:t>Default shape</a:t>
-            </a:r>
-            <a:endParaRPr lang="en-GB">
-              <a:solidFill>
-                <a:schemeClr val="accent2"/>
-              </a:solidFill>
-              <a:latin typeface="Slalom Sans Light" panose="00000400000000000000" pitchFamily="50" charset="0"/>
-            </a:endParaRPr>
-          </a:p>
-        </p:txBody>
-      </p:sp>
-      <p:sp>
-        <p:nvSpPr>
-          <p:cNvPr id="13" name="TextBox 12"/>
-          <p:cNvSpPr txBox="1"/>
-          <p:nvPr/>
-        </p:nvSpPr>
-        <p:spPr>
-          <a:xfrm>
-            <a:off x="12527280" y="1249680"/>
-            <a:ext cx="2849880" cy="766763"/>
-          </a:xfrm>
-          <a:prstGeom prst="rect">
-            <a:avLst/>
-          </a:prstGeom>
-          <a:noFill/>
-        </p:spPr>
-        <p:txBody>
-          <a:bodyPr wrap="square" lIns="0" rtlCol="0">
-            <a:noAutofit/>
-          </a:bodyPr>
-          <a:lstStyle/>
-          <a:p>
-            <a:r>
-              <a:rPr lang="en-US" sz="1600">
-                <a:latin typeface="Slalom Sans Light" panose="00000400000000000000" pitchFamily="50" charset="0"/>
-              </a:rPr>
-              <a:t>Default text box</a:t>
-            </a:r>
-            <a:endParaRPr lang="en-GB" sz="1600">
-              <a:latin typeface="Slalom Sans Light" panose="00000400000000000000" pitchFamily="50" charset="0"/>
-            </a:endParaRPr>
           </a:p>
         </p:txBody>
       </p:sp>
@@ -7229,7 +7447,7 @@
         </p:nvSpPr>
         <p:spPr>
           <a:xfrm>
-            <a:off x="352791" y="597571"/>
+            <a:off x="196300" y="385209"/>
             <a:ext cx="10911234" cy="2162331"/>
           </a:xfrm>
           <a:prstGeom prst="rect">
@@ -7494,7 +7712,7 @@
         </p:nvSpPr>
         <p:spPr>
           <a:xfrm>
-            <a:off x="1357073" y="3043403"/>
+            <a:off x="1890286" y="3083357"/>
             <a:ext cx="298810" cy="298810"/>
           </a:xfrm>
           <a:custGeom>
@@ -7979,7 +8197,7 @@
         </p:nvSpPr>
         <p:spPr>
           <a:xfrm>
-            <a:off x="5359653" y="3053992"/>
+            <a:off x="5505785" y="3083357"/>
             <a:ext cx="292264" cy="237585"/>
           </a:xfrm>
           <a:custGeom>
@@ -8317,7 +8535,7 @@
         </p:nvSpPr>
         <p:spPr>
           <a:xfrm>
-            <a:off x="9249910" y="3172785"/>
+            <a:off x="9683192" y="3273244"/>
             <a:ext cx="74702" cy="100887"/>
           </a:xfrm>
           <a:custGeom>
@@ -8415,7 +8633,7 @@
         </p:nvSpPr>
         <p:spPr>
           <a:xfrm>
-            <a:off x="9355687" y="3111945"/>
+            <a:off x="9788969" y="3212404"/>
             <a:ext cx="74702" cy="161727"/>
           </a:xfrm>
           <a:custGeom>
@@ -8507,7 +8725,7 @@
         </p:nvSpPr>
         <p:spPr>
           <a:xfrm>
-            <a:off x="9461464" y="3028772"/>
+            <a:off x="9894746" y="3129231"/>
             <a:ext cx="74702" cy="244901"/>
           </a:xfrm>
           <a:custGeom>
@@ -8599,7 +8817,7 @@
         </p:nvSpPr>
         <p:spPr>
           <a:xfrm>
-            <a:off x="529454" y="3511055"/>
+            <a:off x="1062667" y="3551009"/>
             <a:ext cx="2661370" cy="433196"/>
           </a:xfrm>
           <a:prstGeom prst="rect">
@@ -8633,6 +8851,159 @@
           </a:p>
         </p:txBody>
       </p:sp>
+      <p:sp>
+        <p:nvSpPr>
+          <p:cNvPr id="4" name="TextBox 3">
+            <a:extLst>
+              <a:ext uri="{FF2B5EF4-FFF2-40B4-BE49-F238E27FC236}">
+                <a16:creationId xmlns:a16="http://schemas.microsoft.com/office/drawing/2014/main" id="{838F6CEB-25F2-D244-8D3A-DDF5A7D507E4}"/>
+              </a:ext>
+            </a:extLst>
+          </p:cNvPr>
+          <p:cNvSpPr txBox="1"/>
+          <p:nvPr/>
+        </p:nvSpPr>
+        <p:spPr>
+          <a:xfrm>
+            <a:off x="1233124" y="4588750"/>
+            <a:ext cx="2490913" cy="1711633"/>
+          </a:xfrm>
+          <a:prstGeom prst="rect">
+            <a:avLst/>
+          </a:prstGeom>
+          <a:noFill/>
+        </p:spPr>
+        <p:txBody>
+          <a:bodyPr wrap="square" lIns="0" rtlCol="0">
+            <a:noAutofit/>
+          </a:bodyPr>
+          <a:lstStyle/>
+          <a:p>
+            <a:r>
+              <a:rPr lang="en-US" b="1" dirty="0">
+                <a:latin typeface="+mj-lt"/>
+              </a:rPr>
+              <a:t>Faster and More Frequent Production Deployment </a:t>
+            </a:r>
+          </a:p>
+        </p:txBody>
+      </p:sp>
+      <p:sp>
+        <p:nvSpPr>
+          <p:cNvPr id="6" name="TextBox 5">
+            <a:extLst>
+              <a:ext uri="{FF2B5EF4-FFF2-40B4-BE49-F238E27FC236}">
+                <a16:creationId xmlns:a16="http://schemas.microsoft.com/office/drawing/2014/main" id="{3A3FED71-BF78-FD4E-99B3-2CA661818C92}"/>
+              </a:ext>
+            </a:extLst>
+          </p:cNvPr>
+          <p:cNvSpPr txBox="1"/>
+          <p:nvPr/>
+        </p:nvSpPr>
+        <p:spPr>
+          <a:xfrm>
+            <a:off x="5167614" y="4554793"/>
+            <a:ext cx="1738488" cy="855816"/>
+          </a:xfrm>
+          <a:prstGeom prst="rect">
+            <a:avLst/>
+          </a:prstGeom>
+          <a:noFill/>
+        </p:spPr>
+        <p:txBody>
+          <a:bodyPr wrap="square" lIns="0" rtlCol="0">
+            <a:noAutofit/>
+          </a:bodyPr>
+          <a:lstStyle/>
+          <a:p>
+            <a:r>
+              <a:rPr lang="en-US" b="1" dirty="0">
+                <a:latin typeface="+mj-lt"/>
+              </a:rPr>
+              <a:t>Automated smoke tests</a:t>
+            </a:r>
+          </a:p>
+        </p:txBody>
+      </p:sp>
+      <p:sp>
+        <p:nvSpPr>
+          <p:cNvPr id="7" name="Rectangle 6">
+            <a:extLst>
+              <a:ext uri="{FF2B5EF4-FFF2-40B4-BE49-F238E27FC236}">
+                <a16:creationId xmlns:a16="http://schemas.microsoft.com/office/drawing/2014/main" id="{F5088397-36DA-FF4C-B136-40D24ABB1BE7}"/>
+              </a:ext>
+            </a:extLst>
+          </p:cNvPr>
+          <p:cNvSpPr/>
+          <p:nvPr/>
+        </p:nvSpPr>
+        <p:spPr>
+          <a:xfrm>
+            <a:off x="8882893" y="4510264"/>
+            <a:ext cx="2173109" cy="646331"/>
+          </a:xfrm>
+          <a:prstGeom prst="rect">
+            <a:avLst/>
+          </a:prstGeom>
+        </p:spPr>
+        <p:txBody>
+          <a:bodyPr wrap="square">
+            <a:spAutoFit/>
+          </a:bodyPr>
+          <a:lstStyle/>
+          <a:p>
+            <a:r>
+              <a:rPr lang="en-US" b="1" dirty="0">
+                <a:latin typeface="+mj-lt"/>
+              </a:rPr>
+              <a:t>Detect Security Vulnerabilities</a:t>
+            </a:r>
+            <a:r>
+              <a:rPr lang="en-US" b="1" dirty="0">
+                <a:latin typeface="Slalom Sans Light Italic" panose="00000400000000000000" pitchFamily="50" charset="0"/>
+              </a:rPr>
+              <a:t> </a:t>
+            </a:r>
+          </a:p>
+        </p:txBody>
+      </p:sp>
+      <p:sp>
+        <p:nvSpPr>
+          <p:cNvPr id="8" name="TextBox 7">
+            <a:extLst>
+              <a:ext uri="{FF2B5EF4-FFF2-40B4-BE49-F238E27FC236}">
+                <a16:creationId xmlns:a16="http://schemas.microsoft.com/office/drawing/2014/main" id="{C1C7D6CE-1E3D-914C-AC10-BC23AC164A6F}"/>
+              </a:ext>
+            </a:extLst>
+          </p:cNvPr>
+          <p:cNvSpPr txBox="1"/>
+          <p:nvPr/>
+        </p:nvSpPr>
+        <p:spPr>
+          <a:xfrm>
+            <a:off x="10035822" y="4786489"/>
+            <a:ext cx="0" cy="0"/>
+          </a:xfrm>
+          <a:prstGeom prst="rect">
+            <a:avLst/>
+          </a:prstGeom>
+          <a:noFill/>
+        </p:spPr>
+        <p:txBody>
+          <a:bodyPr wrap="none" lIns="0" rtlCol="0">
+            <a:noAutofit/>
+          </a:bodyPr>
+          <a:lstStyle/>
+          <a:p>
+            <a:r>
+              <a:rPr lang="en-US" sz="1600" dirty="0">
+                <a:latin typeface="Slalom Sans Light" panose="00000400000000000000" pitchFamily="50" charset="0"/>
+              </a:rPr>
+              <a:t> </a:t>
+            </a:r>
+          </a:p>
+        </p:txBody>
+      </p:sp>
     </p:spTree>
     <p:extLst>
       <p:ext uri="{BB962C8B-B14F-4D97-AF65-F5344CB8AC3E}">
@@ -8646,7 +9017,7 @@
 </p:sld>
 </file>
 
-<file path=ppt/slides/slide5.xml><?xml version="1.0" encoding="utf-8"?>
+<file path=ppt/slides/slide6.xml><?xml version="1.0" encoding="utf-8"?>
 <p:sld xmlns:a="http://schemas.openxmlformats.org/drawingml/2006/main" xmlns:r="http://schemas.openxmlformats.org/officeDocument/2006/relationships" xmlns:p="http://schemas.openxmlformats.org/presentationml/2006/main">
   <p:cSld>
     <p:spTree>
@@ -8971,7 +9342,7 @@
                 <a:tabLst/>
                 <a:defRPr/>
               </a:pPr>
-              <a:t>5</a:t>
+              <a:t>6</a:t>
             </a:fld>
             <a:endParaRPr kumimoji="0" lang="en-GB" sz="800" b="0" i="0" u="none" strike="noStrike" kern="1200" cap="none" spc="0" normalizeH="0" baseline="0" noProof="0" dirty="0">
               <a:ln>
@@ -9178,7 +9549,7 @@
 </p:sld>
 </file>
 
-<file path=ppt/slides/slide6.xml><?xml version="1.0" encoding="utf-8"?>
+<file path=ppt/slides/slide7.xml><?xml version="1.0" encoding="utf-8"?>
 <p:sld xmlns:a="http://schemas.openxmlformats.org/drawingml/2006/main" xmlns:r="http://schemas.openxmlformats.org/officeDocument/2006/relationships" xmlns:p="http://schemas.openxmlformats.org/presentationml/2006/main">
   <p:cSld>
     <p:bg>
@@ -9424,7 +9795,7 @@
                 <a:tabLst/>
                 <a:defRPr/>
               </a:pPr>
-              <a:t>6</a:t>
+              <a:t>7</a:t>
             </a:fld>
             <a:endParaRPr kumimoji="0" lang="en-GB" sz="800" b="0" i="0" u="none" strike="noStrike" kern="1200" cap="none" spc="0" normalizeH="0" baseline="0" noProof="0" dirty="0">
               <a:ln>
@@ -9636,7 +10007,7 @@
 </p:sld>
 </file>
 
-<file path=ppt/slides/slide7.xml><?xml version="1.0" encoding="utf-8"?>
+<file path=ppt/slides/slide8.xml><?xml version="1.0" encoding="utf-8"?>
 <p:sld xmlns:a="http://schemas.openxmlformats.org/drawingml/2006/main" xmlns:r="http://schemas.openxmlformats.org/officeDocument/2006/relationships" xmlns:p="http://schemas.openxmlformats.org/presentationml/2006/main">
   <p:cSld>
     <p:bg>
@@ -9684,7 +10055,7 @@
           <a:p>
             <a:fld id="{D89D76C3-A5A9-4168-BE2E-6A3D1757D92E}" type="slidenum">
               <a:rPr lang="en-GB" smtClean="0"/>
-              <a:t>7</a:t>
+              <a:t>8</a:t>
             </a:fld>
             <a:endParaRPr lang="en-GB"/>
           </a:p>
@@ -9818,7 +10189,7 @@
 </p:sld>
 </file>
 
-<file path=ppt/slides/slide8.xml><?xml version="1.0" encoding="utf-8"?>
+<file path=ppt/slides/slide9.xml><?xml version="1.0" encoding="utf-8"?>
 <p:sld xmlns:a="http://schemas.openxmlformats.org/drawingml/2006/main" xmlns:r="http://schemas.openxmlformats.org/officeDocument/2006/relationships" xmlns:p="http://schemas.openxmlformats.org/presentationml/2006/main">
   <p:cSld>
     <p:spTree>
@@ -9853,7 +10224,7 @@
             <a:fld id="{D89D76C3-A5A9-4168-BE2E-6A3D1757D92E}" type="slidenum">
               <a:rPr lang="en-GB" smtClean="0"/>
               <a:pPr/>
-              <a:t>8</a:t>
+              <a:t>9</a:t>
             </a:fld>
             <a:endParaRPr lang="en-GB"/>
           </a:p>
@@ -14244,15 +14615,6 @@
 </file>
 
 <file path=customXml/item1.xml><?xml version="1.0" encoding="utf-8"?>
-<?mso-contentType ?>
-<FormTemplates xmlns="http://schemas.microsoft.com/sharepoint/v3/contenttype/forms">
-  <Display>DocumentLibraryForm</Display>
-  <Edit>DocumentLibraryForm</Edit>
-  <New>DocumentLibraryForm</New>
-</FormTemplates>
-</file>
-
-<file path=customXml/item2.xml><?xml version="1.0" encoding="utf-8"?>
 <ct:contentTypeSchema xmlns:ct="http://schemas.microsoft.com/office/2006/metadata/contentType" xmlns:ma="http://schemas.microsoft.com/office/2006/metadata/properties/metaAttributes" ct:_="" ma:_="" ma:contentTypeName="Document" ma:contentTypeID="0x0101002106D8940D7E474C81206741DFF1A187" ma:contentTypeVersion="2" ma:contentTypeDescription="Create a new document." ma:contentTypeScope="" ma:versionID="4a7cea56504639e33412c5f5b9fc44f5">
   <xsd:schema xmlns:xsd="http://www.w3.org/2001/XMLSchema" xmlns:xs="http://www.w3.org/2001/XMLSchema" xmlns:p="http://schemas.microsoft.com/office/2006/metadata/properties" xmlns:ns2="688f81b3-add1-4848-9903-9e79280bdbc2" targetNamespace="http://schemas.microsoft.com/office/2006/metadata/properties" ma:root="true" ma:fieldsID="fca95ec89f486fa20a116f523121f4f8" ns2:_="">
     <xsd:import namespace="688f81b3-add1-4848-9903-9e79280bdbc2"/>
@@ -14384,6 +14746,15 @@
 </ct:contentTypeSchema>
 </file>
 
+<file path=customXml/item2.xml><?xml version="1.0" encoding="utf-8"?>
+<?mso-contentType ?>
+<FormTemplates xmlns="http://schemas.microsoft.com/sharepoint/v3/contenttype/forms">
+  <Display>DocumentLibraryForm</Display>
+  <Edit>DocumentLibraryForm</Edit>
+  <New>DocumentLibraryForm</New>
+</FormTemplates>
+</file>
+
 <file path=customXml/item3.xml><?xml version="1.0" encoding="utf-8"?>
 <p:properties xmlns:p="http://schemas.microsoft.com/office/2006/metadata/properties" xmlns:xsi="http://www.w3.org/2001/XMLSchema-instance" xmlns:pc="http://schemas.microsoft.com/office/infopath/2007/PartnerControls">
   <documentManagement/>
@@ -14391,14 +14762,6 @@
 </file>
 
 <file path=customXml/itemProps1.xml><?xml version="1.0" encoding="utf-8"?>
-<ds:datastoreItem xmlns:ds="http://schemas.openxmlformats.org/officeDocument/2006/customXml" ds:itemID="{8129816E-A34A-478F-BB60-AA115C97BCCA}">
-  <ds:schemaRefs>
-    <ds:schemaRef ds:uri="http://schemas.microsoft.com/sharepoint/v3/contenttype/forms"/>
-  </ds:schemaRefs>
-</ds:datastoreItem>
-</file>
-
-<file path=customXml/itemProps2.xml><?xml version="1.0" encoding="utf-8"?>
 <ds:datastoreItem xmlns:ds="http://schemas.openxmlformats.org/officeDocument/2006/customXml" ds:itemID="{345B7BB3-E76E-4AF0-925F-98C0CCE548AB}">
   <ds:schemaRefs>
     <ds:schemaRef ds:uri="http://schemas.microsoft.com/office/2006/metadata/contentType"/>
@@ -14412,6 +14775,14 @@
     <ds:schemaRef ds:uri="http://purl.org/dc/elements/1.1/"/>
     <ds:schemaRef ds:uri="http://purl.org/dc/terms/"/>
     <ds:schemaRef ds:uri="http://schemas.microsoft.com/internal/obd"/>
+  </ds:schemaRefs>
+</ds:datastoreItem>
+</file>
+
+<file path=customXml/itemProps2.xml><?xml version="1.0" encoding="utf-8"?>
+<ds:datastoreItem xmlns:ds="http://schemas.openxmlformats.org/officeDocument/2006/customXml" ds:itemID="{8129816E-A34A-478F-BB60-AA115C97BCCA}">
+  <ds:schemaRefs>
+    <ds:schemaRef ds:uri="http://schemas.microsoft.com/sharepoint/v3/contenttype/forms"/>
   </ds:schemaRefs>
 </ds:datastoreItem>
 </file>

</xml_diff>